<commit_message>
updated software-design and presentation
</commit_message>
<xml_diff>
--- a/documents/00_Sitzungen/Meilenstein_1/Meilenstein_1.pptx
+++ b/documents/00_Sitzungen/Meilenstein_1/Meilenstein_1.pptx
@@ -4633,25 +4633,52 @@
           </a:p>
         </p:txBody>
       </p:sp>
-      <p:sp>
-        <p:nvSpPr>
-          <p:cNvPr id="2" name="Content Placeholder 1"/>
-          <p:cNvSpPr>
-            <a:spLocks noGrp="1"/>
-          </p:cNvSpPr>
-          <p:nvPr>
-            <p:ph idx="1"/>
-          </p:nvPr>
-        </p:nvSpPr>
-        <p:spPr/>
-        <p:txBody>
-          <a:bodyPr/>
-          <a:lstStyle/>
-          <a:p>
-            <a:endParaRPr lang="en-GB"/>
-          </a:p>
-        </p:txBody>
-      </p:sp>
+      <p:pic>
+        <p:nvPicPr>
+          <p:cNvPr id="3" name="Picture 2"/>
+          <p:cNvPicPr>
+            <a:picLocks noChangeAspect="1"/>
+          </p:cNvPicPr>
+          <p:nvPr/>
+        </p:nvPicPr>
+        <p:blipFill rotWithShape="1">
+          <a:blip r:embed="rId2"/>
+          <a:srcRect b="9387"/>
+          <a:stretch/>
+        </p:blipFill>
+        <p:spPr>
+          <a:xfrm>
+            <a:off x="453919" y="1268761"/>
+            <a:ext cx="3457057" cy="4536504"/>
+          </a:xfrm>
+          <a:prstGeom prst="rect">
+            <a:avLst/>
+          </a:prstGeom>
+        </p:spPr>
+      </p:pic>
+      <p:pic>
+        <p:nvPicPr>
+          <p:cNvPr id="4" name="Picture 3"/>
+          <p:cNvPicPr>
+            <a:picLocks noChangeAspect="1"/>
+          </p:cNvPicPr>
+          <p:nvPr/>
+        </p:nvPicPr>
+        <p:blipFill rotWithShape="1">
+          <a:blip r:embed="rId3"/>
+          <a:srcRect t="12560"/>
+          <a:stretch/>
+        </p:blipFill>
+        <p:spPr>
+          <a:xfrm>
+            <a:off x="4351101" y="1268761"/>
+            <a:ext cx="3895573" cy="3007816"/>
+          </a:xfrm>
+          <a:prstGeom prst="rect">
+            <a:avLst/>
+          </a:prstGeom>
+        </p:spPr>
+      </p:pic>
     </p:spTree>
   </p:cSld>
   <p:clrMapOvr>

</xml_diff>

<commit_message>
Meilenstein 1 Präsentation + Web Design Teil
</commit_message>
<xml_diff>
--- a/documents/00_Sitzungen/Meilenstein_1/Meilenstein_1.pptx
+++ b/documents/00_Sitzungen/Meilenstein_1/Meilenstein_1.pptx
@@ -12,9 +12,12 @@
     <p:sldId id="275" r:id="rId6"/>
     <p:sldId id="273" r:id="rId7"/>
     <p:sldId id="272" r:id="rId8"/>
-    <p:sldId id="261" r:id="rId9"/>
-    <p:sldId id="262" r:id="rId10"/>
-    <p:sldId id="271" r:id="rId11"/>
+    <p:sldId id="278" r:id="rId9"/>
+    <p:sldId id="276" r:id="rId10"/>
+    <p:sldId id="277" r:id="rId11"/>
+    <p:sldId id="261" r:id="rId12"/>
+    <p:sldId id="262" r:id="rId13"/>
+    <p:sldId id="271" r:id="rId14"/>
   </p:sldIdLst>
   <p:sldSz cx="9144000" cy="6858000" type="screen4x3"/>
   <p:notesSz cx="6858000" cy="9144000"/>
@@ -403,7 +406,7 @@
               <a:pPr>
                 <a:defRPr/>
               </a:pPr>
-              <a:t>‹#›</a:t>
+              <a:t>‹Nr.›</a:t>
             </a:fld>
             <a:endParaRPr lang="es-ES" altLang="de-DE"/>
           </a:p>
@@ -599,7 +602,7 @@
               <a:pPr>
                 <a:defRPr/>
               </a:pPr>
-              <a:t>‹#›</a:t>
+              <a:t>‹Nr.›</a:t>
             </a:fld>
             <a:endParaRPr lang="es-ES" altLang="de-DE"/>
           </a:p>
@@ -805,7 +808,7 @@
               <a:pPr>
                 <a:defRPr/>
               </a:pPr>
-              <a:t>‹#›</a:t>
+              <a:t>‹Nr.›</a:t>
             </a:fld>
             <a:endParaRPr lang="es-ES" altLang="de-DE"/>
           </a:p>
@@ -1005,7 +1008,7 @@
               <a:pPr>
                 <a:defRPr/>
               </a:pPr>
-              <a:t>‹#›</a:t>
+              <a:t>‹Nr.›</a:t>
             </a:fld>
             <a:endParaRPr lang="es-ES" altLang="de-DE"/>
           </a:p>
@@ -1223,7 +1226,7 @@
               <a:pPr>
                 <a:defRPr/>
               </a:pPr>
-              <a:t>‹#›</a:t>
+              <a:t>‹Nr.›</a:t>
             </a:fld>
             <a:endParaRPr lang="es-ES" altLang="de-DE"/>
           </a:p>
@@ -1485,7 +1488,7 @@
               <a:pPr>
                 <a:defRPr/>
               </a:pPr>
-              <a:t>‹#›</a:t>
+              <a:t>‹Nr.›</a:t>
             </a:fld>
             <a:endParaRPr lang="es-ES" altLang="de-DE"/>
           </a:p>
@@ -1920,7 +1923,7 @@
               <a:pPr>
                 <a:defRPr/>
               </a:pPr>
-              <a:t>‹#›</a:t>
+              <a:t>‹Nr.›</a:t>
             </a:fld>
             <a:endParaRPr lang="es-ES" altLang="de-DE"/>
           </a:p>
@@ -2068,7 +2071,7 @@
               <a:pPr>
                 <a:defRPr/>
               </a:pPr>
-              <a:t>‹#›</a:t>
+              <a:t>‹Nr.›</a:t>
             </a:fld>
             <a:endParaRPr lang="es-ES" altLang="de-DE"/>
           </a:p>
@@ -2189,7 +2192,7 @@
               <a:pPr>
                 <a:defRPr/>
               </a:pPr>
-              <a:t>‹#›</a:t>
+              <a:t>‹Nr.›</a:t>
             </a:fld>
             <a:endParaRPr lang="es-ES" altLang="de-DE"/>
           </a:p>
@@ -2492,7 +2495,7 @@
               <a:pPr>
                 <a:defRPr/>
               </a:pPr>
-              <a:t>‹#›</a:t>
+              <a:t>‹Nr.›</a:t>
             </a:fld>
             <a:endParaRPr lang="es-ES" altLang="de-DE"/>
           </a:p>
@@ -2772,7 +2775,7 @@
               <a:pPr>
                 <a:defRPr/>
               </a:pPr>
-              <a:t>‹#›</a:t>
+              <a:t>‹Nr.›</a:t>
             </a:fld>
             <a:endParaRPr lang="es-ES" altLang="de-DE"/>
           </a:p>
@@ -3246,7 +3249,7 @@
               <a:pPr>
                 <a:defRPr/>
               </a:pPr>
-              <a:t>‹#›</a:t>
+              <a:t>‹Nr.›</a:t>
             </a:fld>
             <a:endParaRPr lang="es-ES" altLang="de-DE"/>
           </a:p>
@@ -3945,10 +3948,280 @@
   <p:clrMapOvr>
     <a:masterClrMapping/>
   </p:clrMapOvr>
+  <p:timing>
+    <p:tnLst>
+      <p:par>
+        <p:cTn id="1" dur="indefinite" restart="never" nodeType="tmRoot"/>
+      </p:par>
+    </p:tnLst>
+  </p:timing>
 </p:sld>
 </file>
 
 <file path=ppt/slides/slide10.xml><?xml version="1.0" encoding="utf-8"?>
+<p:sld xmlns:a="http://schemas.openxmlformats.org/drawingml/2006/main" xmlns:r="http://schemas.openxmlformats.org/officeDocument/2006/relationships" xmlns:p="http://schemas.openxmlformats.org/presentationml/2006/main">
+  <p:cSld>
+    <p:spTree>
+      <p:nvGrpSpPr>
+        <p:cNvPr id="1" name=""/>
+        <p:cNvGrpSpPr/>
+        <p:nvPr/>
+      </p:nvGrpSpPr>
+      <p:grpSpPr>
+        <a:xfrm>
+          <a:off x="0" y="0"/>
+          <a:ext cx="0" cy="0"/>
+          <a:chOff x="0" y="0"/>
+          <a:chExt cx="0" cy="0"/>
+        </a:xfrm>
+      </p:grpSpPr>
+      <p:sp>
+        <p:nvSpPr>
+          <p:cNvPr id="7" name="Title 6"/>
+          <p:cNvSpPr>
+            <a:spLocks noGrp="1"/>
+          </p:cNvSpPr>
+          <p:nvPr>
+            <p:ph type="title"/>
+          </p:nvPr>
+        </p:nvSpPr>
+        <p:spPr/>
+        <p:txBody>
+          <a:bodyPr/>
+          <a:lstStyle/>
+          <a:p>
+            <a:r>
+              <a:rPr lang="de-DE" dirty="0"/>
+              <a:t>UI - Design</a:t>
+            </a:r>
+            <a:endParaRPr lang="de-CH" dirty="0"/>
+          </a:p>
+        </p:txBody>
+      </p:sp>
+      <p:pic>
+        <p:nvPicPr>
+          <p:cNvPr id="3" name="Inhaltsplatzhalter 2"/>
+          <p:cNvPicPr>
+            <a:picLocks noGrp="1" noChangeAspect="1"/>
+          </p:cNvPicPr>
+          <p:nvPr>
+            <p:ph idx="1"/>
+          </p:nvPr>
+        </p:nvPicPr>
+        <p:blipFill rotWithShape="1">
+          <a:blip r:embed="rId2" cstate="print">
+            <a:extLst>
+              <a:ext uri="{28A0092B-C50C-407E-A947-70E740481C1C}">
+                <a14:useLocalDpi xmlns:a14="http://schemas.microsoft.com/office/drawing/2010/main" val="0"/>
+              </a:ext>
+            </a:extLst>
+          </a:blip>
+          <a:srcRect t="8214" b="9071"/>
+          <a:stretch/>
+        </p:blipFill>
+        <p:spPr>
+          <a:xfrm>
+            <a:off x="1954147" y="274638"/>
+            <a:ext cx="5235705" cy="6109070"/>
+          </a:xfrm>
+        </p:spPr>
+      </p:pic>
+    </p:spTree>
+    <p:extLst>
+      <p:ext uri="{BB962C8B-B14F-4D97-AF65-F5344CB8AC3E}">
+        <p14:creationId xmlns:p14="http://schemas.microsoft.com/office/powerpoint/2010/main" val="4092965131"/>
+      </p:ext>
+    </p:extLst>
+  </p:cSld>
+  <p:clrMapOvr>
+    <a:masterClrMapping/>
+  </p:clrMapOvr>
+  <p:timing>
+    <p:tnLst>
+      <p:par>
+        <p:cTn id="1" dur="indefinite" restart="never" nodeType="tmRoot"/>
+      </p:par>
+    </p:tnLst>
+  </p:timing>
+</p:sld>
+</file>
+
+<file path=ppt/slides/slide11.xml><?xml version="1.0" encoding="utf-8"?>
+<p:sld xmlns:a="http://schemas.openxmlformats.org/drawingml/2006/main" xmlns:r="http://schemas.openxmlformats.org/officeDocument/2006/relationships" xmlns:p="http://schemas.openxmlformats.org/presentationml/2006/main">
+  <p:cSld>
+    <p:spTree>
+      <p:nvGrpSpPr>
+        <p:cNvPr id="1" name=""/>
+        <p:cNvGrpSpPr/>
+        <p:nvPr/>
+      </p:nvGrpSpPr>
+      <p:grpSpPr>
+        <a:xfrm>
+          <a:off x="0" y="0"/>
+          <a:ext cx="0" cy="0"/>
+          <a:chOff x="0" y="0"/>
+          <a:chExt cx="0" cy="0"/>
+        </a:xfrm>
+      </p:grpSpPr>
+      <p:sp>
+        <p:nvSpPr>
+          <p:cNvPr id="6146" name="Rectangle 7"/>
+          <p:cNvSpPr>
+            <a:spLocks noGrp="1" noChangeArrowheads="1"/>
+          </p:cNvSpPr>
+          <p:nvPr>
+            <p:ph type="title"/>
+          </p:nvPr>
+        </p:nvSpPr>
+        <p:spPr/>
+        <p:txBody>
+          <a:bodyPr/>
+          <a:lstStyle/>
+          <a:p>
+            <a:pPr algn="l" eaLnBrk="1" hangingPunct="1"/>
+            <a:r>
+              <a:rPr lang="de-DE" altLang="de-DE" dirty="0"/>
+              <a:t>Software - Entwurf</a:t>
+            </a:r>
+          </a:p>
+        </p:txBody>
+      </p:sp>
+      <p:sp>
+        <p:nvSpPr>
+          <p:cNvPr id="2" name="Content Placeholder 1"/>
+          <p:cNvSpPr>
+            <a:spLocks noGrp="1"/>
+          </p:cNvSpPr>
+          <p:nvPr>
+            <p:ph idx="1"/>
+          </p:nvPr>
+        </p:nvSpPr>
+        <p:spPr/>
+        <p:txBody>
+          <a:bodyPr/>
+          <a:lstStyle/>
+          <a:p>
+            <a:endParaRPr lang="en-GB"/>
+          </a:p>
+        </p:txBody>
+      </p:sp>
+    </p:spTree>
+  </p:cSld>
+  <p:clrMapOvr>
+    <a:masterClrMapping/>
+  </p:clrMapOvr>
+  <p:timing>
+    <p:tnLst>
+      <p:par>
+        <p:cTn id="1" dur="indefinite" restart="never" nodeType="tmRoot"/>
+      </p:par>
+    </p:tnLst>
+  </p:timing>
+</p:sld>
+</file>
+
+<file path=ppt/slides/slide12.xml><?xml version="1.0" encoding="utf-8"?>
+<p:sld xmlns:a="http://schemas.openxmlformats.org/drawingml/2006/main" xmlns:r="http://schemas.openxmlformats.org/officeDocument/2006/relationships" xmlns:p="http://schemas.openxmlformats.org/presentationml/2006/main">
+  <p:cSld>
+    <p:spTree>
+      <p:nvGrpSpPr>
+        <p:cNvPr id="1" name=""/>
+        <p:cNvGrpSpPr/>
+        <p:nvPr/>
+      </p:nvGrpSpPr>
+      <p:grpSpPr>
+        <a:xfrm>
+          <a:off x="0" y="0"/>
+          <a:ext cx="0" cy="0"/>
+          <a:chOff x="0" y="0"/>
+          <a:chExt cx="0" cy="0"/>
+        </a:xfrm>
+      </p:grpSpPr>
+      <p:sp>
+        <p:nvSpPr>
+          <p:cNvPr id="7170" name="Rectangle 7"/>
+          <p:cNvSpPr>
+            <a:spLocks noGrp="1" noChangeArrowheads="1"/>
+          </p:cNvSpPr>
+          <p:nvPr>
+            <p:ph type="title"/>
+          </p:nvPr>
+        </p:nvSpPr>
+        <p:spPr/>
+        <p:txBody>
+          <a:bodyPr/>
+          <a:lstStyle/>
+          <a:p>
+            <a:pPr algn="l" eaLnBrk="1" hangingPunct="1"/>
+            <a:r>
+              <a:rPr lang="de-DE" altLang="de-DE" dirty="0"/>
+              <a:t>Ausblick</a:t>
+            </a:r>
+          </a:p>
+        </p:txBody>
+      </p:sp>
+      <p:pic>
+        <p:nvPicPr>
+          <p:cNvPr id="3" name="Picture 2"/>
+          <p:cNvPicPr>
+            <a:picLocks noChangeAspect="1"/>
+          </p:cNvPicPr>
+          <p:nvPr/>
+        </p:nvPicPr>
+        <p:blipFill rotWithShape="1">
+          <a:blip r:embed="rId2"/>
+          <a:srcRect b="9387"/>
+          <a:stretch/>
+        </p:blipFill>
+        <p:spPr>
+          <a:xfrm>
+            <a:off x="453919" y="1268761"/>
+            <a:ext cx="3457057" cy="4536504"/>
+          </a:xfrm>
+          <a:prstGeom prst="rect">
+            <a:avLst/>
+          </a:prstGeom>
+        </p:spPr>
+      </p:pic>
+      <p:pic>
+        <p:nvPicPr>
+          <p:cNvPr id="4" name="Picture 3"/>
+          <p:cNvPicPr>
+            <a:picLocks noChangeAspect="1"/>
+          </p:cNvPicPr>
+          <p:nvPr/>
+        </p:nvPicPr>
+        <p:blipFill rotWithShape="1">
+          <a:blip r:embed="rId3"/>
+          <a:srcRect t="12560"/>
+          <a:stretch/>
+        </p:blipFill>
+        <p:spPr>
+          <a:xfrm>
+            <a:off x="4351101" y="1268761"/>
+            <a:ext cx="3895573" cy="3007816"/>
+          </a:xfrm>
+          <a:prstGeom prst="rect">
+            <a:avLst/>
+          </a:prstGeom>
+        </p:spPr>
+      </p:pic>
+    </p:spTree>
+  </p:cSld>
+  <p:clrMapOvr>
+    <a:masterClrMapping/>
+  </p:clrMapOvr>
+  <p:timing>
+    <p:tnLst>
+      <p:par>
+        <p:cTn id="1" dur="indefinite" restart="never" nodeType="tmRoot"/>
+      </p:par>
+    </p:tnLst>
+  </p:timing>
+</p:sld>
+</file>
+
+<file path=ppt/slides/slide13.xml><?xml version="1.0" encoding="utf-8"?>
 <p:sld xmlns:a="http://schemas.openxmlformats.org/drawingml/2006/main" xmlns:r="http://schemas.openxmlformats.org/officeDocument/2006/relationships" xmlns:p="http://schemas.openxmlformats.org/presentationml/2006/main">
   <p:cSld>
     <p:spTree>
@@ -4162,6 +4435,13 @@
   <p:clrMapOvr>
     <a:masterClrMapping/>
   </p:clrMapOvr>
+  <p:timing>
+    <p:tnLst>
+      <p:par>
+        <p:cTn id="1" dur="indefinite" restart="never" nodeType="tmRoot"/>
+      </p:par>
+    </p:tnLst>
+  </p:timing>
 </p:sld>
 </file>
 
@@ -4232,6 +4512,13 @@
   <p:clrMapOvr>
     <a:masterClrMapping/>
   </p:clrMapOvr>
+  <p:timing>
+    <p:tnLst>
+      <p:par>
+        <p:cTn id="1" dur="indefinite" restart="never" nodeType="tmRoot"/>
+      </p:par>
+    </p:tnLst>
+  </p:timing>
 </p:sld>
 </file>
 
@@ -4304,6 +4591,13 @@
   <p:clrMapOvr>
     <a:masterClrMapping/>
   </p:clrMapOvr>
+  <p:timing>
+    <p:tnLst>
+      <p:par>
+        <p:cTn id="1" dur="indefinite" restart="never" nodeType="tmRoot"/>
+      </p:par>
+    </p:tnLst>
+  </p:timing>
 </p:sld>
 </file>
 
@@ -4379,6 +4673,13 @@
   <p:clrMapOvr>
     <a:masterClrMapping/>
   </p:clrMapOvr>
+  <p:timing>
+    <p:tnLst>
+      <p:par>
+        <p:cTn id="1" dur="indefinite" restart="never" nodeType="tmRoot"/>
+      </p:par>
+    </p:tnLst>
+  </p:timing>
 </p:sld>
 </file>
 
@@ -4451,6 +4752,13 @@
   <p:clrMapOvr>
     <a:masterClrMapping/>
   </p:clrMapOvr>
+  <p:timing>
+    <p:tnLst>
+      <p:par>
+        <p:cTn id="1" dur="indefinite" restart="never" nodeType="tmRoot"/>
+      </p:par>
+    </p:tnLst>
+  </p:timing>
 </p:sld>
 </file>
 
@@ -4494,25 +4802,34 @@
           </a:p>
         </p:txBody>
       </p:sp>
-      <p:sp>
-        <p:nvSpPr>
-          <p:cNvPr id="2" name="Content Placeholder 1"/>
-          <p:cNvSpPr>
-            <a:spLocks noGrp="1"/>
-          </p:cNvSpPr>
+      <p:pic>
+        <p:nvPicPr>
+          <p:cNvPr id="3" name="Inhaltsplatzhalter 2"/>
+          <p:cNvPicPr>
+            <a:picLocks noGrp="1" noChangeAspect="1"/>
+          </p:cNvPicPr>
           <p:nvPr>
             <p:ph idx="1"/>
           </p:nvPr>
-        </p:nvSpPr>
-        <p:spPr/>
-        <p:txBody>
-          <a:bodyPr/>
-          <a:lstStyle/>
-          <a:p>
-            <a:endParaRPr lang="en-GB"/>
-          </a:p>
-        </p:txBody>
-      </p:sp>
+        </p:nvPicPr>
+        <p:blipFill rotWithShape="1">
+          <a:blip r:embed="rId2" cstate="print">
+            <a:extLst>
+              <a:ext uri="{28A0092B-C50C-407E-A947-70E740481C1C}">
+                <a14:useLocalDpi xmlns:a14="http://schemas.microsoft.com/office/drawing/2010/main" val="0"/>
+              </a:ext>
+            </a:extLst>
+          </a:blip>
+          <a:srcRect t="7877" b="12231"/>
+          <a:stretch/>
+        </p:blipFill>
+        <p:spPr>
+          <a:xfrm>
+            <a:off x="1852392" y="274638"/>
+            <a:ext cx="5439215" cy="6129909"/>
+          </a:xfrm>
+        </p:spPr>
+      </p:pic>
     </p:spTree>
     <p:extLst>
       <p:ext uri="{BB962C8B-B14F-4D97-AF65-F5344CB8AC3E}">
@@ -4523,6 +4840,81 @@
   <p:clrMapOvr>
     <a:masterClrMapping/>
   </p:clrMapOvr>
+  <p:timing>
+    <p:tnLst>
+      <p:par>
+        <p:cTn id="1" dur="indefinite" restart="never" nodeType="tmRoot">
+          <p:childTnLst>
+            <p:seq concurrent="1" nextAc="seek">
+              <p:cTn id="2" dur="indefinite" nodeType="mainSeq">
+                <p:childTnLst>
+                  <p:par>
+                    <p:cTn id="3" fill="hold">
+                      <p:stCondLst>
+                        <p:cond delay="indefinite"/>
+                      </p:stCondLst>
+                      <p:childTnLst>
+                        <p:par>
+                          <p:cTn id="4" fill="hold">
+                            <p:stCondLst>
+                              <p:cond delay="0"/>
+                            </p:stCondLst>
+                            <p:childTnLst>
+                              <p:par>
+                                <p:cTn id="5" presetID="1" presetClass="entr" presetSubtype="0" fill="hold" nodeType="clickEffect">
+                                  <p:stCondLst>
+                                    <p:cond delay="0"/>
+                                  </p:stCondLst>
+                                  <p:childTnLst>
+                                    <p:set>
+                                      <p:cBhvr>
+                                        <p:cTn id="6" dur="1" fill="hold">
+                                          <p:stCondLst>
+                                            <p:cond delay="0"/>
+                                          </p:stCondLst>
+                                        </p:cTn>
+                                        <p:tgtEl>
+                                          <p:spTgt spid="3"/>
+                                        </p:tgtEl>
+                                        <p:attrNameLst>
+                                          <p:attrName>style.visibility</p:attrName>
+                                        </p:attrNameLst>
+                                      </p:cBhvr>
+                                      <p:to>
+                                        <p:strVal val="visible"/>
+                                      </p:to>
+                                    </p:set>
+                                  </p:childTnLst>
+                                </p:cTn>
+                              </p:par>
+                            </p:childTnLst>
+                          </p:cTn>
+                        </p:par>
+                      </p:childTnLst>
+                    </p:cTn>
+                  </p:par>
+                </p:childTnLst>
+              </p:cTn>
+              <p:prevCondLst>
+                <p:cond evt="onPrev" delay="0">
+                  <p:tgtEl>
+                    <p:sldTgt/>
+                  </p:tgtEl>
+                </p:cond>
+              </p:prevCondLst>
+              <p:nextCondLst>
+                <p:cond evt="onNext" delay="0">
+                  <p:tgtEl>
+                    <p:sldTgt/>
+                  </p:tgtEl>
+                </p:cond>
+              </p:nextCondLst>
+            </p:seq>
+          </p:childTnLst>
+        </p:cTn>
+      </p:par>
+    </p:tnLst>
+  </p:timing>
 </p:sld>
 </file>
 
@@ -4545,9 +4937,9 @@
       </p:grpSpPr>
       <p:sp>
         <p:nvSpPr>
-          <p:cNvPr id="6146" name="Rectangle 7"/>
-          <p:cNvSpPr>
-            <a:spLocks noGrp="1" noChangeArrowheads="1"/>
+          <p:cNvPr id="7" name="Title 6"/>
+          <p:cNvSpPr>
+            <a:spLocks noGrp="1"/>
           </p:cNvSpPr>
           <p:nvPr>
             <p:ph type="title"/>
@@ -4558,38 +4950,59 @@
           <a:bodyPr/>
           <a:lstStyle/>
           <a:p>
-            <a:pPr algn="l" eaLnBrk="1" hangingPunct="1"/>
-            <a:r>
-              <a:rPr lang="de-DE" altLang="de-DE" dirty="0"/>
-              <a:t>Software - Entwurf</a:t>
-            </a:r>
-          </a:p>
-        </p:txBody>
-      </p:sp>
-      <p:sp>
-        <p:nvSpPr>
-          <p:cNvPr id="2" name="Content Placeholder 1"/>
-          <p:cNvSpPr>
-            <a:spLocks noGrp="1"/>
-          </p:cNvSpPr>
+            <a:r>
+              <a:rPr lang="de-DE" dirty="0"/>
+              <a:t>UI - Design</a:t>
+            </a:r>
+            <a:endParaRPr lang="de-CH" dirty="0"/>
+          </a:p>
+        </p:txBody>
+      </p:sp>
+      <p:pic>
+        <p:nvPicPr>
+          <p:cNvPr id="3" name="Inhaltsplatzhalter 2"/>
+          <p:cNvPicPr>
+            <a:picLocks noGrp="1" noChangeAspect="1"/>
+          </p:cNvPicPr>
           <p:nvPr>
             <p:ph idx="1"/>
           </p:nvPr>
-        </p:nvSpPr>
-        <p:spPr/>
-        <p:txBody>
-          <a:bodyPr/>
-          <a:lstStyle/>
-          <a:p>
-            <a:endParaRPr lang="en-GB"/>
-          </a:p>
-        </p:txBody>
-      </p:sp>
+        </p:nvPicPr>
+        <p:blipFill rotWithShape="1">
+          <a:blip r:embed="rId2" cstate="print">
+            <a:extLst>
+              <a:ext uri="{28A0092B-C50C-407E-A947-70E740481C1C}">
+                <a14:useLocalDpi xmlns:a14="http://schemas.microsoft.com/office/drawing/2010/main" val="0"/>
+              </a:ext>
+            </a:extLst>
+          </a:blip>
+          <a:srcRect t="8451" b="12115"/>
+          <a:stretch/>
+        </p:blipFill>
+        <p:spPr>
+          <a:xfrm>
+            <a:off x="1831326" y="274638"/>
+            <a:ext cx="5481347" cy="6151825"/>
+          </a:xfrm>
+        </p:spPr>
+      </p:pic>
     </p:spTree>
+    <p:extLst>
+      <p:ext uri="{BB962C8B-B14F-4D97-AF65-F5344CB8AC3E}">
+        <p14:creationId xmlns:p14="http://schemas.microsoft.com/office/powerpoint/2010/main" val="2365601504"/>
+      </p:ext>
+    </p:extLst>
   </p:cSld>
   <p:clrMapOvr>
     <a:masterClrMapping/>
   </p:clrMapOvr>
+  <p:timing>
+    <p:tnLst>
+      <p:par>
+        <p:cTn id="1" dur="indefinite" restart="never" nodeType="tmRoot"/>
+      </p:par>
+    </p:tnLst>
+  </p:timing>
 </p:sld>
 </file>
 
@@ -4612,9 +5025,9 @@
       </p:grpSpPr>
       <p:sp>
         <p:nvSpPr>
-          <p:cNvPr id="7170" name="Rectangle 7"/>
-          <p:cNvSpPr>
-            <a:spLocks noGrp="1" noChangeArrowheads="1"/>
+          <p:cNvPr id="7" name="Title 6"/>
+          <p:cNvSpPr>
+            <a:spLocks noGrp="1"/>
           </p:cNvSpPr>
           <p:nvPr>
             <p:ph type="title"/>
@@ -4625,65 +5038,59 @@
           <a:bodyPr/>
           <a:lstStyle/>
           <a:p>
-            <a:pPr algn="l" eaLnBrk="1" hangingPunct="1"/>
-            <a:r>
-              <a:rPr lang="de-DE" altLang="de-DE" dirty="0"/>
-              <a:t>Ausblick</a:t>
-            </a:r>
+            <a:r>
+              <a:rPr lang="de-DE" dirty="0"/>
+              <a:t>UI - Design</a:t>
+            </a:r>
+            <a:endParaRPr lang="de-CH" dirty="0"/>
           </a:p>
         </p:txBody>
       </p:sp>
       <p:pic>
         <p:nvPicPr>
-          <p:cNvPr id="3" name="Picture 2"/>
+          <p:cNvPr id="4" name="Inhaltsplatzhalter 3"/>
           <p:cNvPicPr>
-            <a:picLocks noChangeAspect="1"/>
+            <a:picLocks noGrp="1" noChangeAspect="1"/>
           </p:cNvPicPr>
-          <p:nvPr/>
+          <p:nvPr>
+            <p:ph idx="1"/>
+          </p:nvPr>
         </p:nvPicPr>
         <p:blipFill rotWithShape="1">
-          <a:blip r:embed="rId2"/>
-          <a:srcRect b="9387"/>
+          <a:blip r:embed="rId2" cstate="print">
+            <a:extLst>
+              <a:ext uri="{28A0092B-C50C-407E-A947-70E740481C1C}">
+                <a14:useLocalDpi xmlns:a14="http://schemas.microsoft.com/office/drawing/2010/main" val="0"/>
+              </a:ext>
+            </a:extLst>
+          </a:blip>
+          <a:srcRect t="8723" b="12323"/>
           <a:stretch/>
         </p:blipFill>
         <p:spPr>
           <a:xfrm>
-            <a:off x="453919" y="1268761"/>
-            <a:ext cx="3457057" cy="4536504"/>
+            <a:off x="1838187" y="274638"/>
+            <a:ext cx="5467625" cy="6070072"/>
           </a:xfrm>
-          <a:prstGeom prst="rect">
-            <a:avLst/>
-          </a:prstGeom>
-        </p:spPr>
-      </p:pic>
-      <p:pic>
-        <p:nvPicPr>
-          <p:cNvPr id="4" name="Picture 3"/>
-          <p:cNvPicPr>
-            <a:picLocks noChangeAspect="1"/>
-          </p:cNvPicPr>
-          <p:nvPr/>
-        </p:nvPicPr>
-        <p:blipFill rotWithShape="1">
-          <a:blip r:embed="rId3"/>
-          <a:srcRect t="12560"/>
-          <a:stretch/>
-        </p:blipFill>
-        <p:spPr>
-          <a:xfrm>
-            <a:off x="4351101" y="1268761"/>
-            <a:ext cx="3895573" cy="3007816"/>
-          </a:xfrm>
-          <a:prstGeom prst="rect">
-            <a:avLst/>
-          </a:prstGeom>
         </p:spPr>
       </p:pic>
     </p:spTree>
+    <p:extLst>
+      <p:ext uri="{BB962C8B-B14F-4D97-AF65-F5344CB8AC3E}">
+        <p14:creationId xmlns:p14="http://schemas.microsoft.com/office/powerpoint/2010/main" val="1743800184"/>
+      </p:ext>
+    </p:extLst>
   </p:cSld>
   <p:clrMapOvr>
     <a:masterClrMapping/>
   </p:clrMapOvr>
+  <p:timing>
+    <p:tnLst>
+      <p:par>
+        <p:cTn id="1" dur="indefinite" restart="never" nodeType="tmRoot"/>
+      </p:par>
+    </p:tnLst>
+  </p:timing>
 </p:sld>
 </file>
 

</xml_diff>